<commit_message>
Compaction Team Week3 YJ243 inhoinnno
Compaction Team Week3 YJ243 inhoinnno
</commit_message>
<xml_diff>
--- a/RF1_Team_Compaction/RocksDB_Festival_Compaction_Team1_Quantitative_Analysis3_v0.3(송인호 한예진).pptx
+++ b/RF1_Team_Compaction/RocksDB_Festival_Compaction_Team1_Quantitative_Analysis3_v0.3(송인호 한예진).pptx
@@ -29385,7 +29385,7 @@
         <p:spPr>
           <a:xfrm>
             <a:off x="5699434" y="2716678"/>
-            <a:ext cx="1284326" cy="338554"/>
+            <a:ext cx="1409360" cy="338554"/>
           </a:xfrm>
           <a:prstGeom prst="rect">
             <a:avLst/>
@@ -29398,6 +29398,15 @@
           </a:bodyPr>
           <a:lstStyle/>
           <a:p>
+            <a:r>
+              <a:rPr lang="en-US" altLang="ko-KR" sz="1600">
+                <a:solidFill>
+                  <a:srgbClr val="FF0000"/>
+                </a:solidFill>
+                <a:latin typeface="Abadi" panose="020B0604020104020204" pitchFamily="34" charset="0"/>
+              </a:rPr>
+              <a:t>Right </a:t>
+            </a:r>
             <a:r>
               <a:rPr lang="en-US" altLang="ko-KR" sz="1600" dirty="0">
                 <a:solidFill>
@@ -29405,7 +29414,7 @@
                 </a:solidFill>
                 <a:latin typeface="Abadi" panose="020B0604020104020204" pitchFamily="34" charset="0"/>
               </a:rPr>
-              <a:t>Left is better</a:t>
+              <a:t>is better</a:t>
             </a:r>
             <a:endParaRPr lang="ko-KR" altLang="en-US" sz="1600" dirty="0">
               <a:solidFill>
@@ -30844,7 +30853,7 @@
         <p:spPr>
           <a:xfrm>
             <a:off x="5699434" y="2716678"/>
-            <a:ext cx="1284326" cy="338554"/>
+            <a:ext cx="1409360" cy="338554"/>
           </a:xfrm>
           <a:prstGeom prst="rect">
             <a:avLst/>
@@ -30857,6 +30866,15 @@
           </a:bodyPr>
           <a:lstStyle/>
           <a:p>
+            <a:r>
+              <a:rPr lang="en-US" altLang="ko-KR" sz="1600">
+                <a:solidFill>
+                  <a:srgbClr val="FF0000"/>
+                </a:solidFill>
+                <a:latin typeface="Abadi" panose="020B0604020104020204" pitchFamily="34" charset="0"/>
+              </a:rPr>
+              <a:t>Right </a:t>
+            </a:r>
             <a:r>
               <a:rPr lang="en-US" altLang="ko-KR" sz="1600" dirty="0">
                 <a:solidFill>
@@ -30864,7 +30882,7 @@
                 </a:solidFill>
                 <a:latin typeface="Abadi" panose="020B0604020104020204" pitchFamily="34" charset="0"/>
               </a:rPr>
-              <a:t>Left is better</a:t>
+              <a:t>is better</a:t>
             </a:r>
             <a:endParaRPr lang="ko-KR" altLang="en-US" sz="1600" dirty="0">
               <a:solidFill>

</xml_diff>